<commit_message>
Fix på sista bilderna
</commit_message>
<xml_diff>
--- a/Kafka Summit-part1-v06.pptx
+++ b/Kafka Summit-part1-v06.pptx
@@ -237,7 +237,7 @@
           <a:p>
             <a:fld id="{1A376ABD-C746-5F4A-ABB8-FF5F9E1789F6}" type="datetimeFigureOut">
               <a:rPr lang="en-US" smtClean="0"/>
-              <a:t>3/18/18</a:t>
+              <a:t>3/30/18</a:t>
             </a:fld>
             <a:endParaRPr lang="en-US"/>
           </a:p>
@@ -396,7 +396,7 @@
           <a:p>
             <a:fld id="{F3D1F925-BFA2-264B-AE5B-B0906316BC34}" type="slidenum">
               <a:rPr lang="en-US" smtClean="0"/>
-              <a:t>‹#›</a:t>
+              <a:t>‹Nr.›</a:t>
             </a:fld>
             <a:endParaRPr lang="en-US"/>
           </a:p>
@@ -4850,7 +4850,6 @@
               <a:rPr lang="sv-SE" baseline="0" dirty="0" smtClean="0"/>
               <a:t> systems </a:t>
             </a:r>
-            <a:endParaRPr lang="sv-SE" baseline="0" dirty="0" smtClean="0"/>
           </a:p>
           <a:p>
             <a:pPr marL="171450" lvl="0" indent="-171450">
@@ -8674,7 +8673,7 @@
           <a:p>
             <a:fld id="{6332AF82-E98F-8C47-B5BC-EDAF4B2AF6A5}" type="slidenum">
               <a:rPr lang="en-US" smtClean="0"/>
-              <a:t>‹#›</a:t>
+              <a:t>‹Nr.›</a:t>
             </a:fld>
             <a:endParaRPr lang="en-US"/>
           </a:p>
@@ -8796,7 +8795,7 @@
           <a:p>
             <a:fld id="{6332AF82-E98F-8C47-B5BC-EDAF4B2AF6A5}" type="slidenum">
               <a:rPr lang="en-US" smtClean="0"/>
-              <a:t>‹#›</a:t>
+              <a:t>‹Nr.›</a:t>
             </a:fld>
             <a:endParaRPr lang="en-US"/>
           </a:p>
@@ -8918,7 +8917,7 @@
           <a:p>
             <a:fld id="{6332AF82-E98F-8C47-B5BC-EDAF4B2AF6A5}" type="slidenum">
               <a:rPr lang="en-US" smtClean="0"/>
-              <a:t>‹#›</a:t>
+              <a:t>‹Nr.›</a:t>
             </a:fld>
             <a:endParaRPr lang="en-US"/>
           </a:p>
@@ -9153,7 +9152,7 @@
           <a:p>
             <a:fld id="{6332AF82-E98F-8C47-B5BC-EDAF4B2AF6A5}" type="slidenum">
               <a:rPr lang="en-US" smtClean="0"/>
-              <a:t>‹#›</a:t>
+              <a:t>‹Nr.›</a:t>
             </a:fld>
             <a:endParaRPr lang="en-US"/>
           </a:p>
@@ -9368,7 +9367,7 @@
           <a:p>
             <a:fld id="{6332AF82-E98F-8C47-B5BC-EDAF4B2AF6A5}" type="slidenum">
               <a:rPr lang="en-US" smtClean="0"/>
-              <a:t>‹#›</a:t>
+              <a:t>‹Nr.›</a:t>
             </a:fld>
             <a:endParaRPr lang="en-US"/>
           </a:p>
@@ -9482,7 +9481,7 @@
           <a:p>
             <a:fld id="{6332AF82-E98F-8C47-B5BC-EDAF4B2AF6A5}" type="slidenum">
               <a:rPr lang="en-US" smtClean="0"/>
-              <a:t>‹#›</a:t>
+              <a:t>‹Nr.›</a:t>
             </a:fld>
             <a:endParaRPr lang="en-US"/>
           </a:p>
@@ -9693,7 +9692,7 @@
           <a:p>
             <a:fld id="{6332AF82-E98F-8C47-B5BC-EDAF4B2AF6A5}" type="slidenum">
               <a:rPr lang="en-US" smtClean="0"/>
-              <a:t>‹#›</a:t>
+              <a:t>‹Nr.›</a:t>
             </a:fld>
             <a:endParaRPr lang="en-US"/>
           </a:p>
@@ -9752,7 +9751,7 @@
               <a:pPr>
                 <a:defRPr/>
               </a:pPr>
-              <a:t>‹#›</a:t>
+              <a:t>‹Nr.›</a:t>
             </a:fld>
             <a:endParaRPr lang="sv-SE" dirty="0"/>
           </a:p>
@@ -9974,7 +9973,7 @@
             <a:fld id="{6332AF82-E98F-8C47-B5BC-EDAF4B2AF6A5}" type="slidenum">
               <a:rPr lang="en-US" smtClean="0"/>
               <a:pPr/>
-              <a:t>‹#›</a:t>
+              <a:t>‹Nr.›</a:t>
             </a:fld>
             <a:endParaRPr lang="en-US"/>
           </a:p>
@@ -10104,7 +10103,7 @@
             <a:fld id="{6332AF82-E98F-8C47-B5BC-EDAF4B2AF6A5}" type="slidenum">
               <a:rPr lang="en-US" smtClean="0"/>
               <a:pPr/>
-              <a:t>‹#›</a:t>
+              <a:t>‹Nr.›</a:t>
             </a:fld>
             <a:endParaRPr lang="en-US"/>
           </a:p>
@@ -10290,7 +10289,7 @@
             <a:fld id="{6332AF82-E98F-8C47-B5BC-EDAF4B2AF6A5}" type="slidenum">
               <a:rPr lang="en-US" smtClean="0"/>
               <a:pPr/>
-              <a:t>‹#›</a:t>
+              <a:t>‹Nr.›</a:t>
             </a:fld>
             <a:endParaRPr lang="en-US"/>
           </a:p>
@@ -10379,7 +10378,7 @@
             <a:fld id="{6332AF82-E98F-8C47-B5BC-EDAF4B2AF6A5}" type="slidenum">
               <a:rPr lang="en-US" smtClean="0"/>
               <a:pPr/>
-              <a:t>‹#›</a:t>
+              <a:t>‹Nr.›</a:t>
             </a:fld>
             <a:endParaRPr lang="en-US"/>
           </a:p>
@@ -10592,7 +10591,7 @@
             <a:fld id="{6332AF82-E98F-8C47-B5BC-EDAF4B2AF6A5}" type="slidenum">
               <a:rPr lang="en-US" smtClean="0"/>
               <a:pPr/>
-              <a:t>‹#›</a:t>
+              <a:t>‹Nr.›</a:t>
             </a:fld>
             <a:endParaRPr lang="en-US"/>
           </a:p>
@@ -11459,7 +11458,7 @@
             <a:fld id="{6332AF82-E98F-8C47-B5BC-EDAF4B2AF6A5}" type="slidenum">
               <a:rPr lang="en-US" smtClean="0"/>
               <a:pPr/>
-              <a:t>‹#›</a:t>
+              <a:t>‹Nr.›</a:t>
             </a:fld>
             <a:endParaRPr lang="en-US" dirty="0"/>
           </a:p>
@@ -12097,7 +12096,7 @@
           <a:p>
             <a:fld id="{6332AF82-E98F-8C47-B5BC-EDAF4B2AF6A5}" type="slidenum">
               <a:rPr lang="en-US" smtClean="0"/>
-              <a:t>‹#›</a:t>
+              <a:t>‹Nr.›</a:t>
             </a:fld>
             <a:endParaRPr lang="en-US"/>
           </a:p>
@@ -12272,7 +12271,7 @@
           <a:p>
             <a:fld id="{6332AF82-E98F-8C47-B5BC-EDAF4B2AF6A5}" type="slidenum">
               <a:rPr lang="en-US" smtClean="0"/>
-              <a:t>‹#›</a:t>
+              <a:t>‹Nr.›</a:t>
             </a:fld>
             <a:endParaRPr lang="en-US"/>
           </a:p>
@@ -12625,7 +12624,7 @@
             <a:fld id="{6332AF82-E98F-8C47-B5BC-EDAF4B2AF6A5}" type="slidenum">
               <a:rPr lang="en-US" smtClean="0"/>
               <a:pPr/>
-              <a:t>‹#›</a:t>
+              <a:t>‹Nr.›</a:t>
             </a:fld>
             <a:endParaRPr lang="en-US" dirty="0"/>
           </a:p>
@@ -13955,11 +13954,7 @@
               </a:r>
               <a:r>
                 <a:rPr lang="sv-SE" sz="2000" b="1" dirty="0" smtClean="0"/>
-                <a:t> </a:t>
-              </a:r>
-              <a:r>
-                <a:rPr lang="sv-SE" sz="2000" b="1" dirty="0" smtClean="0"/>
-                <a:t>gen</a:t>
+                <a:t> gen</a:t>
               </a:r>
               <a:endParaRPr lang="sv-SE" sz="2000" b="1" dirty="0"/>
             </a:p>
@@ -56035,7 +56030,7 @@
             </a:pPr>
             <a:fld id="{21987273-BE94-984A-B105-CE7120D57418}" type="datetime1">
               <a:rPr lang="sv-SE" smtClean="0"/>
-              <a:t>2018-03-18</a:t>
+              <a:t>2018-03-30</a:t>
             </a:fld>
             <a:endParaRPr lang="sv-SE" dirty="0"/>
           </a:p>
@@ -56383,11 +56378,7 @@
             </a:r>
             <a:r>
               <a:rPr lang="sv-SE" sz="2000" b="1" dirty="0" smtClean="0"/>
-              <a:t> </a:t>
-            </a:r>
-            <a:r>
-              <a:rPr lang="sv-SE" sz="2000" b="1" dirty="0" smtClean="0"/>
-              <a:t>gen</a:t>
+              <a:t> gen</a:t>
             </a:r>
             <a:endParaRPr lang="sv-SE" sz="2000" b="1" dirty="0"/>
           </a:p>
@@ -56754,11 +56745,7 @@
             </a:r>
             <a:r>
               <a:rPr lang="sv-SE" sz="2000" b="1" dirty="0" smtClean="0"/>
-              <a:t> </a:t>
-            </a:r>
-            <a:r>
-              <a:rPr lang="sv-SE" sz="2000" b="1" dirty="0" smtClean="0"/>
-              <a:t>gen</a:t>
+              <a:t> gen</a:t>
             </a:r>
             <a:endParaRPr lang="sv-SE" sz="2000" b="1" dirty="0"/>
           </a:p>

</xml_diff>